<commit_message>
Add use case slide.
</commit_message>
<xml_diff>
--- a/force16/20160415-jones-codemeta-overview.pptx
+++ b/force16/20160415-jones-codemeta-overview.pptx
@@ -5,20 +5,21 @@
     <p:sldMasterId id="2147483697" r:id="rId1"/>
   </p:sldMasterIdLst>
   <p:notesMasterIdLst>
-    <p:notesMasterId r:id="rId13"/>
+    <p:notesMasterId r:id="rId14"/>
   </p:notesMasterIdLst>
   <p:sldIdLst>
     <p:sldId id="770" r:id="rId2"/>
     <p:sldId id="778" r:id="rId3"/>
     <p:sldId id="779" r:id="rId4"/>
     <p:sldId id="771" r:id="rId5"/>
-    <p:sldId id="772" r:id="rId6"/>
-    <p:sldId id="773" r:id="rId7"/>
-    <p:sldId id="774" r:id="rId8"/>
-    <p:sldId id="775" r:id="rId9"/>
-    <p:sldId id="768" r:id="rId10"/>
-    <p:sldId id="776" r:id="rId11"/>
-    <p:sldId id="777" r:id="rId12"/>
+    <p:sldId id="780" r:id="rId6"/>
+    <p:sldId id="772" r:id="rId7"/>
+    <p:sldId id="773" r:id="rId8"/>
+    <p:sldId id="774" r:id="rId9"/>
+    <p:sldId id="775" r:id="rId10"/>
+    <p:sldId id="768" r:id="rId11"/>
+    <p:sldId id="776" r:id="rId12"/>
+    <p:sldId id="777" r:id="rId13"/>
   </p:sldIdLst>
   <p:sldSz cx="9144000" cy="6858000" type="screen4x3"/>
   <p:notesSz cx="6858000" cy="9144000"/>
@@ -130,6 +131,7 @@
             <p14:sldId id="778"/>
             <p14:sldId id="779"/>
             <p14:sldId id="771"/>
+            <p14:sldId id="780"/>
             <p14:sldId id="772"/>
             <p14:sldId id="773"/>
             <p14:sldId id="774"/>
@@ -227,7 +229,7 @@
           <a:p>
             <a:fld id="{EE4A230F-5879-8041-8DB3-F8DCCE4E14A8}" type="datetimeFigureOut">
               <a:rPr lang="en-US" smtClean="0"/>
-              <a:t>4/15/16</a:t>
+              <a:t>4/16/16</a:t>
             </a:fld>
             <a:endParaRPr lang="en-US"/>
           </a:p>
@@ -2731,11 +2733,7 @@
             </a:br>
             <a:r>
               <a:rPr lang="en-US" sz="3800" dirty="0" smtClean="0"/>
-              <a:t>A Rosetta Stone for </a:t>
-            </a:r>
-            <a:r>
-              <a:rPr lang="en-US" sz="3800" dirty="0" smtClean="0"/>
-              <a:t>Software Metadata</a:t>
+              <a:t>A Rosetta Stone for Software Metadata</a:t>
             </a:r>
             <a:endParaRPr sz="3900" dirty="0">
               <a:solidFill>
@@ -3251,6 +3249,218 @@
       </p:grpSpPr>
       <p:sp>
         <p:nvSpPr>
+          <p:cNvPr id="3" name="Title 2"/>
+          <p:cNvSpPr>
+            <a:spLocks noGrp="1"/>
+          </p:cNvSpPr>
+          <p:nvPr>
+            <p:ph type="title"/>
+          </p:nvPr>
+        </p:nvSpPr>
+        <p:spPr/>
+        <p:txBody>
+          <a:bodyPr/>
+          <a:lstStyle/>
+          <a:p>
+            <a:r>
+              <a:rPr lang="en-US" dirty="0" smtClean="0"/>
+              <a:t>Acknowledgements</a:t>
+            </a:r>
+            <a:endParaRPr lang="en-US" dirty="0"/>
+          </a:p>
+        </p:txBody>
+      </p:sp>
+      <p:sp>
+        <p:nvSpPr>
+          <p:cNvPr id="2" name="Content Placeholder 1"/>
+          <p:cNvSpPr>
+            <a:spLocks noGrp="1"/>
+          </p:cNvSpPr>
+          <p:nvPr>
+            <p:ph type="body" idx="1"/>
+          </p:nvPr>
+        </p:nvSpPr>
+        <p:spPr/>
+        <p:txBody>
+          <a:bodyPr/>
+          <a:lstStyle/>
+          <a:p>
+            <a:endParaRPr lang="en-US" dirty="0" smtClean="0"/>
+          </a:p>
+          <a:p>
+            <a:r>
+              <a:rPr lang="en-US" dirty="0" smtClean="0"/>
+              <a:t>Funding for </a:t>
+            </a:r>
+            <a:r>
+              <a:rPr lang="en-US" dirty="0" err="1" smtClean="0"/>
+              <a:t>CodeMeta</a:t>
+            </a:r>
+            <a:r>
+              <a:rPr lang="en-US" dirty="0" smtClean="0"/>
+              <a:t> from NSF</a:t>
+            </a:r>
+          </a:p>
+        </p:txBody>
+      </p:sp>
+      <p:pic>
+        <p:nvPicPr>
+          <p:cNvPr id="4" name="Picture 3" descr="nsf_logo_color_transparent.gif"/>
+          <p:cNvPicPr>
+            <a:picLocks noChangeAspect="1"/>
+          </p:cNvPicPr>
+          <p:nvPr/>
+        </p:nvPicPr>
+        <p:blipFill>
+          <a:blip r:embed="rId2" cstate="print">
+            <a:extLst>
+              <a:ext uri="{28A0092B-C50C-407E-A947-70E740481C1C}">
+                <a14:useLocalDpi xmlns:a14="http://schemas.microsoft.com/office/drawing/2010/main"/>
+              </a:ext>
+            </a:extLst>
+          </a:blip>
+          <a:stretch>
+            <a:fillRect/>
+          </a:stretch>
+        </p:blipFill>
+        <p:spPr>
+          <a:xfrm>
+            <a:off x="5710759" y="1906234"/>
+            <a:ext cx="862684" cy="862684"/>
+          </a:xfrm>
+          <a:prstGeom prst="rect">
+            <a:avLst/>
+          </a:prstGeom>
+        </p:spPr>
+      </p:pic>
+      <p:pic>
+        <p:nvPicPr>
+          <p:cNvPr id="6" name="Shape 88"/>
+          <p:cNvPicPr preferRelativeResize="0"/>
+          <p:nvPr/>
+        </p:nvPicPr>
+        <p:blipFill rotWithShape="1">
+          <a:blip r:embed="rId3">
+            <a:alphaModFix/>
+          </a:blip>
+          <a:srcRect/>
+          <a:stretch/>
+        </p:blipFill>
+        <p:spPr>
+          <a:xfrm>
+            <a:off x="2870009" y="3208880"/>
+            <a:ext cx="3948799" cy="1790719"/>
+          </a:xfrm>
+          <a:prstGeom prst="rect">
+            <a:avLst/>
+          </a:prstGeom>
+          <a:noFill/>
+          <a:ln>
+            <a:noFill/>
+          </a:ln>
+        </p:spPr>
+      </p:pic>
+      <p:sp>
+        <p:nvSpPr>
+          <p:cNvPr id="7" name="Shape 89"/>
+          <p:cNvSpPr/>
+          <p:nvPr/>
+        </p:nvSpPr>
+        <p:spPr>
+          <a:xfrm>
+            <a:off x="264583" y="4952999"/>
+            <a:ext cx="8773583" cy="1739945"/>
+          </a:xfrm>
+          <a:prstGeom prst="rect">
+            <a:avLst/>
+          </a:prstGeom>
+          <a:noFill/>
+          <a:ln>
+            <a:noFill/>
+          </a:ln>
+        </p:spPr>
+        <p:txBody>
+          <a:bodyPr lIns="46577" tIns="46577" rIns="46577" bIns="46577" anchor="ctr" anchorCtr="0">
+            <a:noAutofit/>
+          </a:bodyPr>
+          <a:lstStyle/>
+          <a:p>
+            <a:pPr algn="ctr" rtl="0">
+              <a:buSzPct val="25000"/>
+            </a:pPr>
+            <a:r>
+              <a:rPr lang="en" sz="3300" dirty="0">
+                <a:solidFill>
+                  <a:srgbClr val="000000"/>
+                </a:solidFill>
+                <a:latin typeface="Helvetica Neue"/>
+                <a:ea typeface="Helvetica Neue"/>
+                <a:cs typeface="Helvetica Neue"/>
+                <a:sym typeface="Helvetica Neue"/>
+              </a:rPr>
+              <a:t>This presentation is made available under a CC-BY 4.0 license.</a:t>
+            </a:r>
+          </a:p>
+          <a:p>
+            <a:pPr algn="ctr" rtl="0">
+              <a:buSzPct val="25000"/>
+            </a:pPr>
+            <a:r>
+              <a:rPr lang="en" sz="3300" u="sng" dirty="0">
+                <a:solidFill>
+                  <a:schemeClr val="hlink"/>
+                </a:solidFill>
+                <a:latin typeface="Helvetica Neue"/>
+                <a:ea typeface="Helvetica Neue"/>
+                <a:cs typeface="Helvetica Neue"/>
+                <a:sym typeface="Helvetica Neue"/>
+                <a:hlinkClick r:id="rId4"/>
+              </a:rPr>
+              <a:t>http://creativecommons.org/licenses/by/4.0/</a:t>
+            </a:r>
+          </a:p>
+        </p:txBody>
+      </p:sp>
+    </p:spTree>
+    <p:extLst>
+      <p:ext uri="{BB962C8B-B14F-4D97-AF65-F5344CB8AC3E}">
+        <p14:creationId xmlns:p14="http://schemas.microsoft.com/office/powerpoint/2010/main" val="1275632987"/>
+      </p:ext>
+    </p:extLst>
+  </p:cSld>
+  <p:clrMapOvr>
+    <a:masterClrMapping/>
+  </p:clrMapOvr>
+  <p:transition xmlns:p14="http://schemas.microsoft.com/office/powerpoint/2010/main" spd="med"/>
+  <p:timing>
+    <p:tnLst>
+      <p:par>
+        <p:cTn xmlns:p14="http://schemas.microsoft.com/office/powerpoint/2010/main" id="1" dur="indefinite" restart="never" nodeType="tmRoot"/>
+      </p:par>
+    </p:tnLst>
+  </p:timing>
+</p:sld>
+</file>
+
+<file path=ppt/slides/slide11.xml><?xml version="1.0" encoding="utf-8"?>
+<p:sld xmlns:a="http://schemas.openxmlformats.org/drawingml/2006/main" xmlns:r="http://schemas.openxmlformats.org/officeDocument/2006/relationships" xmlns:p="http://schemas.openxmlformats.org/presentationml/2006/main">
+  <p:cSld>
+    <p:spTree>
+      <p:nvGrpSpPr>
+        <p:cNvPr id="1" name=""/>
+        <p:cNvGrpSpPr/>
+        <p:nvPr/>
+      </p:nvGrpSpPr>
+      <p:grpSpPr>
+        <a:xfrm>
+          <a:off x="0" y="0"/>
+          <a:ext cx="0" cy="0"/>
+          <a:chOff x="0" y="0"/>
+          <a:chExt cx="0" cy="0"/>
+        </a:xfrm>
+      </p:grpSpPr>
+      <p:sp>
+        <p:nvSpPr>
           <p:cNvPr id="2" name="Title 1"/>
           <p:cNvSpPr>
             <a:spLocks noGrp="1"/>
@@ -3406,7 +3616,7 @@
 </p:sld>
 </file>
 
-<file path=ppt/slides/slide11.xml><?xml version="1.0" encoding="utf-8"?>
+<file path=ppt/slides/slide12.xml><?xml version="1.0" encoding="utf-8"?>
 <p:sld xmlns:a="http://schemas.openxmlformats.org/drawingml/2006/main" xmlns:r="http://schemas.openxmlformats.org/officeDocument/2006/relationships" xmlns:p="http://schemas.openxmlformats.org/presentationml/2006/main">
   <p:cSld>
     <p:spTree>
@@ -4206,12 +4416,8 @@
           <a:lstStyle/>
           <a:p>
             <a:r>
-              <a:rPr lang="en-US" dirty="0" err="1" smtClean="0"/>
-              <a:t>CodeMeta</a:t>
-            </a:r>
-            <a:r>
-              <a:rPr lang="en-US" dirty="0" smtClean="0"/>
-              <a:t>: Software Vocabularies (18)</a:t>
+              <a:rPr lang="en-US" dirty="0" smtClean="0"/>
+              <a:t>Software Metadata Use Cases</a:t>
             </a:r>
             <a:endParaRPr lang="en-US" dirty="0"/>
           </a:p>
@@ -4227,379 +4433,69 @@
             <p:ph type="body" idx="1"/>
           </p:nvPr>
         </p:nvSpPr>
-        <p:spPr>
-          <a:xfrm>
-            <a:off x="455413" y="1598414"/>
-            <a:ext cx="3947253" cy="5259586"/>
-          </a:xfrm>
-        </p:spPr>
+        <p:spPr/>
         <p:txBody>
           <a:bodyPr/>
           <a:lstStyle/>
           <a:p>
             <a:r>
-              <a:rPr lang="en-US" dirty="0" err="1" smtClean="0"/>
-              <a:t>code.jsonld</a:t>
+              <a:rPr lang="en-US" dirty="0"/>
+              <a:t>Facilitate c</a:t>
+            </a:r>
+            <a:r>
+              <a:rPr lang="en-US" dirty="0" smtClean="0"/>
+              <a:t>itation</a:t>
             </a:r>
             <a:endParaRPr lang="en-US" dirty="0"/>
           </a:p>
           <a:p>
             <a:r>
-              <a:rPr lang="en-US" dirty="0" err="1"/>
-              <a:t>Figshare</a:t>
+              <a:rPr lang="en-US" dirty="0"/>
+              <a:t>Enable credit, compliance, and </a:t>
+            </a:r>
+            <a:r>
+              <a:rPr lang="en-US" dirty="0" smtClean="0"/>
+              <a:t>quality</a:t>
             </a:r>
             <a:endParaRPr lang="en-US" dirty="0"/>
           </a:p>
           <a:p>
             <a:r>
-              <a:rPr lang="en-US" dirty="0" err="1"/>
-              <a:t>Zenodo</a:t>
+              <a:rPr lang="en-US" dirty="0"/>
+              <a:t>Facilitate discovery and </a:t>
+            </a:r>
+            <a:r>
+              <a:rPr lang="en-US" dirty="0" smtClean="0"/>
+              <a:t>access</a:t>
             </a:r>
             <a:endParaRPr lang="en-US" dirty="0"/>
           </a:p>
           <a:p>
             <a:r>
               <a:rPr lang="en-US" dirty="0"/>
-              <a:t>NIH Software Discovery </a:t>
-            </a:r>
-            <a:r>
-              <a:rPr lang="en-US" dirty="0" smtClean="0"/>
-              <a:t>Index</a:t>
-            </a:r>
+              <a:t>Understand software </a:t>
+            </a:r>
+            <a:r>
+              <a:rPr lang="en-US" dirty="0" smtClean="0"/>
+              <a:t>functionality</a:t>
+            </a:r>
+            <a:endParaRPr lang="en-US" dirty="0"/>
           </a:p>
           <a:p>
             <a:r>
               <a:rPr lang="en-US" dirty="0"/>
-              <a:t>Software </a:t>
-            </a:r>
-            <a:r>
-              <a:rPr lang="en-US" dirty="0" smtClean="0"/>
-              <a:t>Ontology</a:t>
-            </a:r>
-          </a:p>
-          <a:p>
-            <a:r>
-              <a:rPr lang="en-US" dirty="0" smtClean="0"/>
-              <a:t>Dublin Core</a:t>
-            </a:r>
-          </a:p>
-          <a:p>
-            <a:r>
-              <a:rPr lang="en-US" dirty="0" smtClean="0"/>
-              <a:t>R Package</a:t>
-            </a:r>
+              <a:t>Enable </a:t>
+            </a:r>
+            <a:r>
+              <a:rPr lang="en-US" dirty="0" smtClean="0"/>
+              <a:t>interoperability</a:t>
+            </a:r>
+            <a:endParaRPr lang="en-US" dirty="0"/>
           </a:p>
           <a:p>
             <a:r>
               <a:rPr lang="en-US" dirty="0"/>
-              <a:t>Python </a:t>
-            </a:r>
-            <a:r>
-              <a:rPr lang="en-US" dirty="0" err="1"/>
-              <a:t>Distutils</a:t>
-            </a:r>
-            <a:r>
-              <a:rPr lang="en-US" dirty="0"/>
-              <a:t> (</a:t>
-            </a:r>
-            <a:r>
-              <a:rPr lang="en-US" dirty="0" err="1"/>
-              <a:t>PyPI</a:t>
-            </a:r>
-            <a:r>
-              <a:rPr lang="en-US" dirty="0"/>
-              <a:t>) </a:t>
-            </a:r>
-            <a:endParaRPr lang="en-US" dirty="0" smtClean="0"/>
-          </a:p>
-          <a:p>
-            <a:r>
-              <a:rPr lang="en-US" dirty="0" err="1" smtClean="0"/>
-              <a:t>Debian</a:t>
-            </a:r>
-            <a:r>
-              <a:rPr lang="en-US" dirty="0" smtClean="0"/>
-              <a:t> Package</a:t>
-            </a:r>
-            <a:endParaRPr lang="en-US" dirty="0"/>
-          </a:p>
-        </p:txBody>
-      </p:sp>
-      <p:sp>
-        <p:nvSpPr>
-          <p:cNvPr id="4" name="Text Placeholder 2"/>
-          <p:cNvSpPr txBox="1">
-            <a:spLocks/>
-          </p:cNvSpPr>
-          <p:nvPr/>
-        </p:nvSpPr>
-        <p:spPr>
-          <a:xfrm>
-            <a:off x="4413250" y="1598414"/>
-            <a:ext cx="4603750" cy="5259586"/>
-          </a:xfrm>
-          <a:prstGeom prst="rect">
-            <a:avLst/>
-          </a:prstGeom>
-        </p:spPr>
-        <p:txBody>
-          <a:bodyPr lIns="64291" tIns="32146" rIns="64291" bIns="32146"/>
-          <a:lstStyle>
-            <a:lvl1pPr marL="401822" indent="-401822" algn="l" defTabSz="457200" rtl="0" eaLnBrk="1" latinLnBrk="0" hangingPunct="1">
-              <a:spcBef>
-                <a:spcPts val="633"/>
-              </a:spcBef>
-              <a:buClrTx/>
-              <a:buSzPct val="75000"/>
-              <a:buFont typeface="Arial"/>
-              <a:buChar char="•"/>
-              <a:defRPr sz="2800" kern="1200">
-                <a:solidFill>
-                  <a:srgbClr val="1A435D"/>
-                </a:solidFill>
-                <a:latin typeface="+mn-lt"/>
-                <a:ea typeface="+mn-ea"/>
-                <a:cs typeface="Cambria"/>
-              </a:defRPr>
-            </a:lvl1pPr>
-            <a:lvl2pPr marL="714350" indent="-401822" algn="l" defTabSz="457200" rtl="0" eaLnBrk="1" latinLnBrk="0" hangingPunct="1">
-              <a:spcBef>
-                <a:spcPts val="633"/>
-              </a:spcBef>
-              <a:buClrTx/>
-              <a:buSzPct val="75000"/>
-              <a:buFont typeface="Arial"/>
-              <a:buChar char="•"/>
-              <a:defRPr sz="2500" b="0" kern="1200">
-                <a:solidFill>
-                  <a:srgbClr val="1A435D"/>
-                </a:solidFill>
-                <a:latin typeface="+mn-lt"/>
-                <a:ea typeface="+mn-ea"/>
-                <a:cs typeface="Cambria"/>
-              </a:defRPr>
-            </a:lvl2pPr>
-            <a:lvl3pPr marL="946513" indent="-321457" algn="l" defTabSz="457200" rtl="0" eaLnBrk="1" latinLnBrk="0" hangingPunct="1">
-              <a:spcBef>
-                <a:spcPts val="633"/>
-              </a:spcBef>
-              <a:buClrTx/>
-              <a:buSzPct val="75000"/>
-              <a:buFont typeface="Arial"/>
-              <a:buChar char="•"/>
-              <a:defRPr sz="2200" b="0" kern="1200">
-                <a:solidFill>
-                  <a:srgbClr val="1A435D"/>
-                </a:solidFill>
-                <a:latin typeface="+mn-lt"/>
-                <a:ea typeface="+mn-ea"/>
-                <a:cs typeface="Cambria"/>
-              </a:defRPr>
-            </a:lvl3pPr>
-            <a:lvl4pPr marL="1259041" indent="-321457" algn="l" defTabSz="457200" rtl="0" eaLnBrk="1" latinLnBrk="0" hangingPunct="1">
-              <a:spcBef>
-                <a:spcPts val="633"/>
-              </a:spcBef>
-              <a:buClrTx/>
-              <a:buSzPct val="75000"/>
-              <a:buFont typeface="Arial"/>
-              <a:buChar char="•"/>
-              <a:defRPr sz="2000" b="0" i="1" kern="1200">
-                <a:solidFill>
-                  <a:srgbClr val="1A435D"/>
-                </a:solidFill>
-                <a:latin typeface="+mn-lt"/>
-                <a:ea typeface="+mn-ea"/>
-                <a:cs typeface="Cambria"/>
-              </a:defRPr>
-            </a:lvl4pPr>
-            <a:lvl5pPr marL="1571569" indent="-321457" algn="l" defTabSz="457200" rtl="0" eaLnBrk="1" latinLnBrk="0" hangingPunct="1">
-              <a:spcBef>
-                <a:spcPts val="633"/>
-              </a:spcBef>
-              <a:buClrTx/>
-              <a:buSzPct val="75000"/>
-              <a:buFont typeface="Arial"/>
-              <a:buChar char="•"/>
-              <a:defRPr sz="2000" b="0" i="1" kern="1200">
-                <a:solidFill>
-                  <a:srgbClr val="1A435D"/>
-                </a:solidFill>
-                <a:latin typeface="+mn-lt"/>
-                <a:ea typeface="+mn-ea"/>
-                <a:cs typeface="Cambria"/>
-              </a:defRPr>
-            </a:lvl5pPr>
-            <a:lvl6pPr marL="2514600" indent="-228600" algn="l" defTabSz="457200" rtl="0" eaLnBrk="1" latinLnBrk="0" hangingPunct="1">
-              <a:spcBef>
-                <a:spcPct val="20000"/>
-              </a:spcBef>
-              <a:buFont typeface="Arial"/>
-              <a:buChar char="•"/>
-              <a:defRPr sz="2000" kern="1200">
-                <a:solidFill>
-                  <a:schemeClr val="tx1"/>
-                </a:solidFill>
-                <a:latin typeface="+mn-lt"/>
-                <a:ea typeface="+mn-ea"/>
-                <a:cs typeface="+mn-cs"/>
-              </a:defRPr>
-            </a:lvl6pPr>
-            <a:lvl7pPr marL="2971800" indent="-228600" algn="l" defTabSz="457200" rtl="0" eaLnBrk="1" latinLnBrk="0" hangingPunct="1">
-              <a:spcBef>
-                <a:spcPct val="20000"/>
-              </a:spcBef>
-              <a:buFont typeface="Arial"/>
-              <a:buChar char="•"/>
-              <a:defRPr sz="2000" kern="1200">
-                <a:solidFill>
-                  <a:schemeClr val="tx1"/>
-                </a:solidFill>
-                <a:latin typeface="+mn-lt"/>
-                <a:ea typeface="+mn-ea"/>
-                <a:cs typeface="+mn-cs"/>
-              </a:defRPr>
-            </a:lvl7pPr>
-            <a:lvl8pPr marL="3429000" indent="-228600" algn="l" defTabSz="457200" rtl="0" eaLnBrk="1" latinLnBrk="0" hangingPunct="1">
-              <a:spcBef>
-                <a:spcPct val="20000"/>
-              </a:spcBef>
-              <a:buFont typeface="Arial"/>
-              <a:buChar char="•"/>
-              <a:defRPr sz="2000" kern="1200">
-                <a:solidFill>
-                  <a:schemeClr val="tx1"/>
-                </a:solidFill>
-                <a:latin typeface="+mn-lt"/>
-                <a:ea typeface="+mn-ea"/>
-                <a:cs typeface="+mn-cs"/>
-              </a:defRPr>
-            </a:lvl8pPr>
-            <a:lvl9pPr marL="3886200" indent="-228600" algn="l" defTabSz="457200" rtl="0" eaLnBrk="1" latinLnBrk="0" hangingPunct="1">
-              <a:spcBef>
-                <a:spcPct val="20000"/>
-              </a:spcBef>
-              <a:buFont typeface="Arial"/>
-              <a:buChar char="•"/>
-              <a:defRPr sz="2000" kern="1200">
-                <a:solidFill>
-                  <a:schemeClr val="tx1"/>
-                </a:solidFill>
-                <a:latin typeface="+mn-lt"/>
-                <a:ea typeface="+mn-ea"/>
-                <a:cs typeface="+mn-cs"/>
-              </a:defRPr>
-            </a:lvl9pPr>
-          </a:lstStyle>
-          <a:p>
-            <a:r>
-              <a:rPr lang="en-US" dirty="0" err="1" smtClean="0"/>
-              <a:t>GitHub</a:t>
-            </a:r>
-            <a:endParaRPr lang="en-US" dirty="0" smtClean="0"/>
-          </a:p>
-          <a:p>
-            <a:r>
-              <a:rPr lang="en-US" dirty="0" err="1" smtClean="0"/>
-              <a:t>DataCite</a:t>
-            </a:r>
-            <a:r>
-              <a:rPr lang="en-US" dirty="0" smtClean="0"/>
-              <a:t> (Software </a:t>
-            </a:r>
-            <a:r>
-              <a:rPr lang="en-US" dirty="0"/>
-              <a:t>Entities </a:t>
-            </a:r>
-            <a:r>
-              <a:rPr lang="en-US" dirty="0" smtClean="0"/>
-              <a:t>Model)</a:t>
-            </a:r>
-          </a:p>
-          <a:p>
-            <a:r>
-              <a:rPr lang="en-US" dirty="0" smtClean="0"/>
-              <a:t>Trove </a:t>
-            </a:r>
-            <a:r>
-              <a:rPr lang="en-US" dirty="0"/>
-              <a:t>Software Map</a:t>
-            </a:r>
-            <a:r>
-              <a:rPr lang="en-US" dirty="0"/>
-              <a:t> </a:t>
-            </a:r>
-            <a:endParaRPr lang="en-US" dirty="0" smtClean="0"/>
-          </a:p>
-          <a:p>
-            <a:r>
-              <a:rPr lang="en-US" dirty="0" smtClean="0"/>
-              <a:t>Perl Module</a:t>
-            </a:r>
-          </a:p>
-          <a:p>
-            <a:r>
-              <a:rPr lang="en-US" dirty="0" smtClean="0"/>
-              <a:t>JavaScript </a:t>
-            </a:r>
-            <a:r>
-              <a:rPr lang="en-US" dirty="0"/>
-              <a:t>package </a:t>
-            </a:r>
-            <a:r>
-              <a:rPr lang="en-US" dirty="0" smtClean="0"/>
-              <a:t>(</a:t>
-            </a:r>
-            <a:r>
-              <a:rPr lang="en-US" dirty="0" err="1"/>
-              <a:t>npm</a:t>
-            </a:r>
-            <a:r>
-              <a:rPr lang="en-US" dirty="0"/>
-              <a:t>)</a:t>
-            </a:r>
-            <a:r>
-              <a:rPr lang="en-US" dirty="0"/>
-              <a:t> </a:t>
-            </a:r>
-            <a:endParaRPr lang="en-US" dirty="0" smtClean="0"/>
-          </a:p>
-          <a:p>
-            <a:r>
-              <a:rPr lang="en-US" dirty="0" smtClean="0"/>
-              <a:t>Java </a:t>
-            </a:r>
-            <a:r>
-              <a:rPr lang="en-US" dirty="0"/>
-              <a:t>(Maven)</a:t>
-            </a:r>
-            <a:r>
-              <a:rPr lang="en-US" dirty="0"/>
-              <a:t> </a:t>
-            </a:r>
-            <a:endParaRPr lang="en-US" dirty="0" smtClean="0"/>
-          </a:p>
-          <a:p>
-            <a:r>
-              <a:rPr lang="en-US" dirty="0" smtClean="0"/>
-              <a:t>Octave </a:t>
-            </a:r>
-          </a:p>
-          <a:p>
-            <a:r>
-              <a:rPr lang="en-US" dirty="0" smtClean="0"/>
-              <a:t>Ruby Gem</a:t>
-            </a:r>
-            <a:endParaRPr lang="en-US" dirty="0"/>
-          </a:p>
-          <a:p>
-            <a:r>
-              <a:rPr lang="en-US" dirty="0" err="1" smtClean="0"/>
-              <a:t>OntoSoft</a:t>
-            </a:r>
-            <a:r>
-              <a:rPr lang="en-US" dirty="0" smtClean="0"/>
-              <a:t> </a:t>
+              <a:t>Enable transparency and reproducibility</a:t>
             </a:r>
           </a:p>
         </p:txBody>
@@ -4607,7 +4503,7 @@
     </p:spTree>
     <p:extLst>
       <p:ext uri="{BB962C8B-B14F-4D97-AF65-F5344CB8AC3E}">
-        <p14:creationId xmlns:p14="http://schemas.microsoft.com/office/powerpoint/2010/main" val="131598677"/>
+        <p14:creationId xmlns:p14="http://schemas.microsoft.com/office/powerpoint/2010/main" val="3247454020"/>
       </p:ext>
     </p:extLst>
   </p:cSld>
@@ -4615,13 +4511,6 @@
     <a:masterClrMapping/>
   </p:clrMapOvr>
   <p:transition xmlns:p14="http://schemas.microsoft.com/office/powerpoint/2010/main" spd="med"/>
-  <p:timing>
-    <p:tnLst>
-      <p:par>
-        <p:cTn xmlns:p14="http://schemas.microsoft.com/office/powerpoint/2010/main" id="1" dur="indefinite" restart="never" nodeType="tmRoot"/>
-      </p:par>
-    </p:tnLst>
-  </p:timing>
 </p:sld>
 </file>
 
@@ -4663,7 +4552,7 @@
             </a:r>
             <a:r>
               <a:rPr lang="en-US" dirty="0" smtClean="0"/>
-              <a:t> Concepts: Bibliographic</a:t>
+              <a:t>: Software Vocabularies (18)</a:t>
             </a:r>
             <a:endParaRPr lang="en-US" dirty="0"/>
           </a:p>
@@ -4679,76 +4568,101 @@
             <p:ph type="body" idx="1"/>
           </p:nvPr>
         </p:nvSpPr>
-        <p:spPr/>
+        <p:spPr>
+          <a:xfrm>
+            <a:off x="455413" y="1598414"/>
+            <a:ext cx="3947253" cy="5259586"/>
+          </a:xfrm>
+        </p:spPr>
         <p:txBody>
           <a:bodyPr/>
           <a:lstStyle/>
           <a:p>
             <a:r>
+              <a:rPr lang="en-US" dirty="0" err="1" smtClean="0"/>
+              <a:t>code.jsonld</a:t>
+            </a:r>
+            <a:endParaRPr lang="en-US" dirty="0"/>
+          </a:p>
+          <a:p>
+            <a:r>
               <a:rPr lang="en-US" dirty="0" err="1"/>
-              <a:t>SoftwareTitle</a:t>
+              <a:t>Figshare</a:t>
             </a:r>
             <a:endParaRPr lang="en-US" dirty="0"/>
           </a:p>
           <a:p>
             <a:r>
               <a:rPr lang="en-US" dirty="0" err="1"/>
-              <a:t>SoftwareIdentifier</a:t>
+              <a:t>Zenodo</a:t>
             </a:r>
             <a:endParaRPr lang="en-US" dirty="0"/>
           </a:p>
           <a:p>
             <a:r>
+              <a:rPr lang="en-US" dirty="0"/>
+              <a:t>NIH Software Discovery </a:t>
+            </a:r>
+            <a:r>
+              <a:rPr lang="en-US" dirty="0" smtClean="0"/>
+              <a:t>Index</a:t>
+            </a:r>
+          </a:p>
+          <a:p>
+            <a:r>
+              <a:rPr lang="en-US" dirty="0"/>
+              <a:t>Software </a:t>
+            </a:r>
+            <a:r>
+              <a:rPr lang="en-US" dirty="0" smtClean="0"/>
+              <a:t>Ontology</a:t>
+            </a:r>
+          </a:p>
+          <a:p>
+            <a:r>
+              <a:rPr lang="en-US" dirty="0" smtClean="0"/>
+              <a:t>Dublin Core</a:t>
+            </a:r>
+          </a:p>
+          <a:p>
+            <a:r>
+              <a:rPr lang="en-US" dirty="0" smtClean="0"/>
+              <a:t>R Package</a:t>
+            </a:r>
+          </a:p>
+          <a:p>
+            <a:r>
+              <a:rPr lang="en-US" dirty="0"/>
+              <a:t>Python </a:t>
+            </a:r>
+            <a:r>
               <a:rPr lang="en-US" dirty="0" err="1"/>
-              <a:t>SoftwareAuthor</a:t>
+              <a:t>Distutils</a:t>
+            </a:r>
+            <a:r>
+              <a:rPr lang="en-US" dirty="0"/>
+              <a:t> (</a:t>
+            </a:r>
+            <a:r>
+              <a:rPr lang="en-US" dirty="0" err="1"/>
+              <a:t>PyPI</a:t>
+            </a:r>
+            <a:r>
+              <a:rPr lang="en-US" dirty="0"/>
+              <a:t>) </a:t>
+            </a:r>
+            <a:endParaRPr lang="en-US" dirty="0" smtClean="0"/>
+          </a:p>
+          <a:p>
+            <a:r>
+              <a:rPr lang="en-US" dirty="0" err="1" smtClean="0"/>
+              <a:t>Debian</a:t>
+            </a:r>
+            <a:r>
+              <a:rPr lang="en-US" dirty="0" smtClean="0"/>
+              <a:t> Package</a:t>
             </a:r>
             <a:endParaRPr lang="en-US" dirty="0"/>
-          </a:p>
-          <a:p>
-            <a:pPr lvl="1"/>
-            <a:r>
-              <a:rPr lang="en-US" dirty="0" err="1"/>
-              <a:t>AuthorName</a:t>
-            </a:r>
-            <a:endParaRPr lang="en-US" dirty="0"/>
-          </a:p>
-          <a:p>
-            <a:pPr lvl="1"/>
-            <a:r>
-              <a:rPr lang="en-US" dirty="0" err="1"/>
-              <a:t>AuthorId</a:t>
-            </a:r>
-            <a:endParaRPr lang="en-US" dirty="0"/>
-          </a:p>
-          <a:p>
-            <a:pPr lvl="1"/>
-            <a:r>
-              <a:rPr lang="en-US" dirty="0" err="1"/>
-              <a:t>AuthorEmail</a:t>
-            </a:r>
-            <a:endParaRPr lang="en-US" dirty="0"/>
-          </a:p>
-          <a:p>
-            <a:pPr lvl="1"/>
-            <a:r>
-              <a:rPr lang="en-US" dirty="0" err="1"/>
-              <a:t>AuthorAffiliation</a:t>
-            </a:r>
-            <a:endParaRPr lang="en-US" dirty="0"/>
-          </a:p>
-          <a:p>
-            <a:r>
-              <a:rPr lang="en-US" dirty="0" err="1"/>
-              <a:t>SoftwareContributor</a:t>
-            </a:r>
-            <a:endParaRPr lang="en-US" dirty="0"/>
-          </a:p>
-          <a:p>
-            <a:r>
-              <a:rPr lang="en-US" dirty="0" err="1" smtClean="0"/>
-              <a:t>UploadedBy</a:t>
-            </a:r>
-            <a:endParaRPr lang="en-US" dirty="0" smtClean="0"/>
           </a:p>
         </p:txBody>
       </p:sp>
@@ -4762,8 +4676,8 @@
         </p:nvSpPr>
         <p:spPr>
           <a:xfrm>
-            <a:off x="4640064" y="1598414"/>
-            <a:ext cx="8233172" cy="5259586"/>
+            <a:off x="4413250" y="1598414"/>
+            <a:ext cx="4603750" cy="5259586"/>
           </a:xfrm>
           <a:prstGeom prst="rect">
             <a:avLst/>
@@ -4920,73 +4834,109 @@
           </a:lstStyle>
           <a:p>
             <a:r>
-              <a:rPr lang="en-US" dirty="0" smtClean="0"/>
-              <a:t>Description</a:t>
-            </a:r>
-          </a:p>
-          <a:p>
-            <a:r>
               <a:rPr lang="en-US" dirty="0" err="1" smtClean="0"/>
-              <a:t>ControlledTerm</a:t>
+              <a:t>GitHub</a:t>
+            </a:r>
+            <a:endParaRPr lang="en-US" dirty="0" smtClean="0"/>
+          </a:p>
+          <a:p>
+            <a:r>
+              <a:rPr lang="en-US" dirty="0" err="1" smtClean="0"/>
+              <a:t>DataCite</a:t>
+            </a:r>
+            <a:r>
+              <a:rPr lang="en-US" dirty="0" smtClean="0"/>
+              <a:t> (Software </a:t>
+            </a:r>
+            <a:r>
+              <a:rPr lang="en-US" dirty="0"/>
+              <a:t>Entities </a:t>
+            </a:r>
+            <a:r>
+              <a:rPr lang="en-US" dirty="0" smtClean="0"/>
+              <a:t>Model)</a:t>
+            </a:r>
+          </a:p>
+          <a:p>
+            <a:r>
+              <a:rPr lang="en-US" dirty="0" smtClean="0"/>
+              <a:t>Trove </a:t>
+            </a:r>
+            <a:r>
+              <a:rPr lang="en-US" dirty="0"/>
+              <a:t>Software Map </a:t>
+            </a:r>
+            <a:endParaRPr lang="en-US" dirty="0" smtClean="0"/>
+          </a:p>
+          <a:p>
+            <a:r>
+              <a:rPr lang="en-US" dirty="0" smtClean="0"/>
+              <a:t>Perl Module</a:t>
+            </a:r>
+          </a:p>
+          <a:p>
+            <a:r>
+              <a:rPr lang="en-US" dirty="0" smtClean="0"/>
+              <a:t>JavaScript </a:t>
+            </a:r>
+            <a:r>
+              <a:rPr lang="en-US" dirty="0"/>
+              <a:t>package </a:t>
+            </a:r>
+            <a:r>
+              <a:rPr lang="en-US" dirty="0" smtClean="0"/>
+              <a:t>(</a:t>
+            </a:r>
+            <a:r>
+              <a:rPr lang="en-US" dirty="0" err="1"/>
+              <a:t>npm</a:t>
+            </a:r>
+            <a:r>
+              <a:rPr lang="en-US" dirty="0"/>
+              <a:t>) </a:t>
+            </a:r>
+            <a:endParaRPr lang="en-US" dirty="0" smtClean="0"/>
+          </a:p>
+          <a:p>
+            <a:r>
+              <a:rPr lang="en-US" dirty="0" smtClean="0"/>
+              <a:t>Java </a:t>
+            </a:r>
+            <a:r>
+              <a:rPr lang="en-US" dirty="0"/>
+              <a:t>(Maven) </a:t>
+            </a:r>
+            <a:endParaRPr lang="en-US" dirty="0" smtClean="0"/>
+          </a:p>
+          <a:p>
+            <a:r>
+              <a:rPr lang="en-US" dirty="0" smtClean="0"/>
+              <a:t>Octave </a:t>
+            </a:r>
+          </a:p>
+          <a:p>
+            <a:r>
+              <a:rPr lang="en-US" dirty="0" smtClean="0"/>
+              <a:t>Ruby Gem</a:t>
             </a:r>
             <a:endParaRPr lang="en-US" dirty="0"/>
           </a:p>
           <a:p>
             <a:r>
-              <a:rPr lang="en-US" dirty="0" err="1"/>
-              <a:t>ObjectType</a:t>
-            </a:r>
-            <a:endParaRPr lang="en-US" dirty="0"/>
-          </a:p>
-          <a:p>
-            <a:r>
-              <a:rPr lang="en-US" dirty="0" smtClean="0"/>
-              <a:t>Tags</a:t>
-            </a:r>
-          </a:p>
-          <a:p>
-            <a:r>
-              <a:rPr lang="en-US" dirty="0" smtClean="0"/>
-              <a:t>Version</a:t>
-            </a:r>
-          </a:p>
-          <a:p>
-            <a:r>
-              <a:rPr lang="en-US" dirty="0" smtClean="0"/>
-              <a:t>Funding</a:t>
-            </a:r>
-            <a:endParaRPr lang="en-US" dirty="0"/>
-          </a:p>
-          <a:p>
-            <a:r>
               <a:rPr lang="en-US" dirty="0" err="1" smtClean="0"/>
-              <a:t>RelatedPublications</a:t>
-            </a:r>
-            <a:endParaRPr lang="en-US" dirty="0" smtClean="0"/>
-          </a:p>
-          <a:p>
-            <a:endParaRPr lang="en-US" dirty="0"/>
-          </a:p>
-          <a:p>
-            <a:r>
-              <a:rPr lang="en-US" dirty="0" err="1"/>
-              <a:t>DownloadCount</a:t>
-            </a:r>
-            <a:endParaRPr lang="en-US" dirty="0"/>
-          </a:p>
-          <a:p>
-            <a:r>
-              <a:rPr lang="en-US" dirty="0" err="1" smtClean="0"/>
-              <a:t>CitationCount</a:t>
-            </a:r>
-            <a:endParaRPr lang="en-US" dirty="0"/>
+              <a:t>OntoSoft</a:t>
+            </a:r>
+            <a:r>
+              <a:rPr lang="en-US" dirty="0" smtClean="0"/>
+              <a:t> </a:t>
+            </a:r>
           </a:p>
         </p:txBody>
       </p:sp>
     </p:spTree>
     <p:extLst>
       <p:ext uri="{BB962C8B-B14F-4D97-AF65-F5344CB8AC3E}">
-        <p14:creationId xmlns:p14="http://schemas.microsoft.com/office/powerpoint/2010/main" val="1093467648"/>
+        <p14:creationId xmlns:p14="http://schemas.microsoft.com/office/powerpoint/2010/main" val="131598677"/>
       </p:ext>
     </p:extLst>
   </p:cSld>
@@ -5042,7 +4992,7 @@
             </a:r>
             <a:r>
               <a:rPr lang="en-US" dirty="0" smtClean="0"/>
-              <a:t> Concepts: Publication</a:t>
+              <a:t> Concepts: Bibliographic</a:t>
             </a:r>
             <a:endParaRPr lang="en-US" dirty="0"/>
           </a:p>
@@ -5064,64 +5014,70 @@
           <a:lstStyle/>
           <a:p>
             <a:r>
+              <a:rPr lang="en-US" dirty="0" err="1"/>
+              <a:t>SoftwareTitle</a:t>
+            </a:r>
+            <a:endParaRPr lang="en-US" dirty="0"/>
+          </a:p>
+          <a:p>
+            <a:r>
+              <a:rPr lang="en-US" dirty="0" err="1"/>
+              <a:t>SoftwareIdentifier</a:t>
+            </a:r>
+            <a:endParaRPr lang="en-US" dirty="0"/>
+          </a:p>
+          <a:p>
+            <a:r>
+              <a:rPr lang="en-US" dirty="0" err="1"/>
+              <a:t>SoftwareAuthor</a:t>
+            </a:r>
+            <a:endParaRPr lang="en-US" dirty="0"/>
+          </a:p>
+          <a:p>
+            <a:pPr lvl="1"/>
+            <a:r>
+              <a:rPr lang="en-US" dirty="0" err="1"/>
+              <a:t>AuthorName</a:t>
+            </a:r>
+            <a:endParaRPr lang="en-US" dirty="0"/>
+          </a:p>
+          <a:p>
+            <a:pPr lvl="1"/>
+            <a:r>
+              <a:rPr lang="en-US" dirty="0" err="1"/>
+              <a:t>AuthorId</a:t>
+            </a:r>
+            <a:endParaRPr lang="en-US" dirty="0"/>
+          </a:p>
+          <a:p>
+            <a:pPr lvl="1"/>
+            <a:r>
+              <a:rPr lang="en-US" dirty="0" err="1"/>
+              <a:t>AuthorEmail</a:t>
+            </a:r>
+            <a:endParaRPr lang="en-US" dirty="0"/>
+          </a:p>
+          <a:p>
+            <a:pPr lvl="1"/>
+            <a:r>
+              <a:rPr lang="en-US" dirty="0" err="1"/>
+              <a:t>AuthorAffiliation</a:t>
+            </a:r>
+            <a:endParaRPr lang="en-US" dirty="0"/>
+          </a:p>
+          <a:p>
+            <a:r>
+              <a:rPr lang="en-US" dirty="0" err="1"/>
+              <a:t>SoftwareContributor</a:t>
+            </a:r>
+            <a:endParaRPr lang="en-US" dirty="0"/>
+          </a:p>
+          <a:p>
+            <a:r>
               <a:rPr lang="en-US" dirty="0" err="1" smtClean="0"/>
-              <a:t>AccessList</a:t>
-            </a:r>
-            <a:endParaRPr lang="en-US" dirty="0"/>
-          </a:p>
-          <a:p>
-            <a:r>
-              <a:rPr lang="en-US" dirty="0"/>
-              <a:t>License</a:t>
-            </a:r>
-          </a:p>
-          <a:p>
-            <a:r>
-              <a:rPr lang="en-US" dirty="0"/>
-              <a:t>Publisher</a:t>
-            </a:r>
-          </a:p>
-          <a:p>
-            <a:r>
-              <a:rPr lang="en-US" dirty="0" err="1"/>
-              <a:t>datePublished</a:t>
-            </a:r>
-            <a:endParaRPr lang="en-US" dirty="0"/>
-          </a:p>
-          <a:p>
-            <a:r>
-              <a:rPr lang="en-US" dirty="0" err="1"/>
-              <a:t>dateCreated</a:t>
-            </a:r>
-            <a:endParaRPr lang="en-US" dirty="0"/>
-          </a:p>
-          <a:p>
-            <a:r>
-              <a:rPr lang="en-US" dirty="0" err="1"/>
-              <a:t>dateModified</a:t>
-            </a:r>
-            <a:endParaRPr lang="en-US" dirty="0"/>
-          </a:p>
-          <a:p>
-            <a:r>
-              <a:rPr lang="en-US" dirty="0" err="1"/>
-              <a:t>EmbargoDate</a:t>
-            </a:r>
-            <a:endParaRPr lang="en-US" dirty="0"/>
-          </a:p>
-          <a:p>
-            <a:r>
-              <a:rPr lang="en-US" dirty="0" err="1"/>
-              <a:t>SoftwareCitation</a:t>
-            </a:r>
-            <a:endParaRPr lang="en-US" dirty="0"/>
-          </a:p>
-          <a:p>
-            <a:r>
-              <a:rPr lang="en-US" dirty="0" err="1" smtClean="0"/>
-              <a:t>SoftwarePaperCitation</a:t>
-            </a:r>
-            <a:endParaRPr lang="en-US" dirty="0"/>
+              <a:t>UploadedBy</a:t>
+            </a:r>
+            <a:endParaRPr lang="en-US" dirty="0" smtClean="0"/>
           </a:p>
         </p:txBody>
       </p:sp>
@@ -5293,59 +5249,73 @@
           </a:lstStyle>
           <a:p>
             <a:r>
+              <a:rPr lang="en-US" dirty="0" smtClean="0"/>
+              <a:t>Description</a:t>
+            </a:r>
+          </a:p>
+          <a:p>
+            <a:r>
               <a:rPr lang="en-US" dirty="0" err="1" smtClean="0"/>
-              <a:t>RelatedLink</a:t>
+              <a:t>ControlledTerm</a:t>
+            </a:r>
+            <a:endParaRPr lang="en-US" dirty="0"/>
+          </a:p>
+          <a:p>
+            <a:r>
+              <a:rPr lang="en-US" dirty="0" err="1"/>
+              <a:t>ObjectType</a:t>
+            </a:r>
+            <a:endParaRPr lang="en-US" dirty="0"/>
+          </a:p>
+          <a:p>
+            <a:r>
+              <a:rPr lang="en-US" dirty="0" smtClean="0"/>
+              <a:t>Tags</a:t>
+            </a:r>
+          </a:p>
+          <a:p>
+            <a:r>
+              <a:rPr lang="en-US" dirty="0" smtClean="0"/>
+              <a:t>Version</a:t>
+            </a:r>
+          </a:p>
+          <a:p>
+            <a:r>
+              <a:rPr lang="en-US" dirty="0" smtClean="0"/>
+              <a:t>Funding</a:t>
+            </a:r>
+            <a:endParaRPr lang="en-US" dirty="0"/>
+          </a:p>
+          <a:p>
+            <a:r>
+              <a:rPr lang="en-US" dirty="0" err="1" smtClean="0"/>
+              <a:t>RelatedPublications</a:t>
             </a:r>
             <a:endParaRPr lang="en-US" dirty="0" smtClean="0"/>
           </a:p>
           <a:p>
+            <a:endParaRPr lang="en-US" dirty="0"/>
+          </a:p>
+          <a:p>
+            <a:r>
+              <a:rPr lang="en-US" dirty="0" err="1"/>
+              <a:t>DownloadCount</a:t>
+            </a:r>
+            <a:endParaRPr lang="en-US" dirty="0"/>
+          </a:p>
+          <a:p>
             <a:r>
               <a:rPr lang="en-US" dirty="0" err="1" smtClean="0"/>
-              <a:t>CodeRepositoryLink</a:t>
-            </a:r>
-            <a:endParaRPr lang="en-US" dirty="0" smtClean="0"/>
-          </a:p>
-          <a:p>
-            <a:r>
-              <a:rPr lang="en-US" dirty="0" err="1" smtClean="0"/>
-              <a:t>ReadmeLink</a:t>
-            </a:r>
-            <a:endParaRPr lang="en-US" dirty="0" smtClean="0"/>
-          </a:p>
-          <a:p>
-            <a:r>
-              <a:rPr lang="en-US" dirty="0" err="1" smtClean="0"/>
-              <a:t>BuildLink</a:t>
-            </a:r>
-            <a:endParaRPr lang="en-US" dirty="0" smtClean="0"/>
-          </a:p>
-          <a:p>
-            <a:r>
-              <a:rPr lang="en-US" dirty="0" err="1" smtClean="0"/>
-              <a:t>CILink</a:t>
-            </a:r>
-            <a:endParaRPr lang="en-US" dirty="0" smtClean="0"/>
-          </a:p>
-          <a:p>
-            <a:r>
-              <a:rPr lang="en-US" dirty="0" err="1" smtClean="0"/>
-              <a:t>IssueLink</a:t>
-            </a:r>
-            <a:endParaRPr lang="en-US" dirty="0" smtClean="0"/>
-          </a:p>
-          <a:p>
-            <a:r>
-              <a:rPr lang="en-US" dirty="0" err="1" smtClean="0"/>
-              <a:t>ZippedCodeLink</a:t>
-            </a:r>
-            <a:endParaRPr lang="en-US" dirty="0" smtClean="0"/>
+              <a:t>CitationCount</a:t>
+            </a:r>
+            <a:endParaRPr lang="en-US" dirty="0"/>
           </a:p>
         </p:txBody>
       </p:sp>
     </p:spTree>
     <p:extLst>
       <p:ext uri="{BB962C8B-B14F-4D97-AF65-F5344CB8AC3E}">
-        <p14:creationId xmlns:p14="http://schemas.microsoft.com/office/powerpoint/2010/main" val="1727131935"/>
+        <p14:creationId xmlns:p14="http://schemas.microsoft.com/office/powerpoint/2010/main" val="1093467648"/>
       </p:ext>
     </p:extLst>
   </p:cSld>
@@ -5401,7 +5371,7 @@
             </a:r>
             <a:r>
               <a:rPr lang="en-US" dirty="0" smtClean="0"/>
-              <a:t> Concepts: Function</a:t>
+              <a:t> Concepts: Publication</a:t>
             </a:r>
             <a:endParaRPr lang="en-US" dirty="0"/>
           </a:p>
@@ -5423,59 +5393,62 @@
           <a:lstStyle/>
           <a:p>
             <a:r>
-              <a:rPr lang="en-US" dirty="0" smtClean="0"/>
-              <a:t>Inputs</a:t>
+              <a:rPr lang="en-US" dirty="0" err="1" smtClean="0"/>
+              <a:t>AccessList</a:t>
             </a:r>
             <a:endParaRPr lang="en-US" dirty="0"/>
           </a:p>
           <a:p>
             <a:r>
               <a:rPr lang="en-US" dirty="0"/>
-              <a:t>Outputs</a:t>
+              <a:t>License</a:t>
             </a:r>
           </a:p>
           <a:p>
             <a:r>
               <a:rPr lang="en-US" dirty="0"/>
-              <a:t>Function</a:t>
-            </a:r>
-          </a:p>
-          <a:p>
-            <a:r>
-              <a:rPr lang="en-US" dirty="0"/>
-              <a:t>Dependency</a:t>
-            </a:r>
-          </a:p>
-          <a:p>
-            <a:r>
-              <a:rPr lang="en-US" dirty="0"/>
-              <a:t>Suggests</a:t>
-            </a:r>
-          </a:p>
-          <a:p>
-            <a:r>
-              <a:rPr lang="en-US" dirty="0"/>
-              <a:t>Relationship</a:t>
-            </a:r>
-          </a:p>
-          <a:p>
-            <a:r>
-              <a:rPr lang="en-US" dirty="0" smtClean="0"/>
-              <a:t>Package</a:t>
+              <a:t>Publisher</a:t>
+            </a:r>
+          </a:p>
+          <a:p>
+            <a:r>
+              <a:rPr lang="en-US" dirty="0" err="1"/>
+              <a:t>datePublished</a:t>
             </a:r>
             <a:endParaRPr lang="en-US" dirty="0"/>
           </a:p>
           <a:p>
             <a:r>
+              <a:rPr lang="en-US" dirty="0" err="1"/>
+              <a:t>dateCreated</a:t>
+            </a:r>
+            <a:endParaRPr lang="en-US" dirty="0"/>
+          </a:p>
+          <a:p>
+            <a:r>
+              <a:rPr lang="en-US" dirty="0" err="1"/>
+              <a:t>dateModified</a:t>
+            </a:r>
+            <a:endParaRPr lang="en-US" dirty="0"/>
+          </a:p>
+          <a:p>
+            <a:r>
+              <a:rPr lang="en-US" dirty="0" err="1"/>
+              <a:t>EmbargoDate</a:t>
+            </a:r>
+            <a:endParaRPr lang="en-US" dirty="0"/>
+          </a:p>
+          <a:p>
+            <a:r>
+              <a:rPr lang="en-US" dirty="0" err="1"/>
+              <a:t>SoftwareCitation</a:t>
+            </a:r>
+            <a:endParaRPr lang="en-US" dirty="0"/>
+          </a:p>
+          <a:p>
+            <a:r>
               <a:rPr lang="en-US" dirty="0" err="1" smtClean="0"/>
-              <a:t>InteractionMethod</a:t>
-            </a:r>
-            <a:endParaRPr lang="en-US" dirty="0"/>
-          </a:p>
-          <a:p>
-            <a:r>
-              <a:rPr lang="en-US" dirty="0" err="1" smtClean="0"/>
-              <a:t>ProgrammingLanguage</a:t>
+              <a:t>SoftwarePaperCitation</a:t>
             </a:r>
             <a:endParaRPr lang="en-US" dirty="0"/>
           </a:p>
@@ -5649,29 +5622,51 @@
           </a:lstStyle>
           <a:p>
             <a:r>
-              <a:rPr lang="en-US" dirty="0" err="1"/>
-              <a:t>TestCoverage</a:t>
-            </a:r>
-            <a:endParaRPr lang="en-US" dirty="0"/>
-          </a:p>
-          <a:p>
-            <a:r>
-              <a:rPr lang="en-US" dirty="0" err="1"/>
-              <a:t>DocsCoverage</a:t>
-            </a:r>
-            <a:endParaRPr lang="en-US" dirty="0"/>
-          </a:p>
-          <a:p>
-            <a:r>
               <a:rPr lang="en-US" dirty="0" err="1" smtClean="0"/>
-              <a:t>IsAutomated</a:t>
+              <a:t>RelatedLink</a:t>
             </a:r>
             <a:endParaRPr lang="en-US" dirty="0" smtClean="0"/>
           </a:p>
           <a:p>
-            <a:endParaRPr lang="en-US" dirty="0"/>
-          </a:p>
-          <a:p>
+            <a:r>
+              <a:rPr lang="en-US" dirty="0" err="1" smtClean="0"/>
+              <a:t>CodeRepositoryLink</a:t>
+            </a:r>
+            <a:endParaRPr lang="en-US" dirty="0" smtClean="0"/>
+          </a:p>
+          <a:p>
+            <a:r>
+              <a:rPr lang="en-US" dirty="0" err="1" smtClean="0"/>
+              <a:t>ReadmeLink</a:t>
+            </a:r>
+            <a:endParaRPr lang="en-US" dirty="0" smtClean="0"/>
+          </a:p>
+          <a:p>
+            <a:r>
+              <a:rPr lang="en-US" dirty="0" err="1" smtClean="0"/>
+              <a:t>BuildLink</a:t>
+            </a:r>
+            <a:endParaRPr lang="en-US" dirty="0" smtClean="0"/>
+          </a:p>
+          <a:p>
+            <a:r>
+              <a:rPr lang="en-US" dirty="0" err="1" smtClean="0"/>
+              <a:t>CILink</a:t>
+            </a:r>
+            <a:endParaRPr lang="en-US" dirty="0" smtClean="0"/>
+          </a:p>
+          <a:p>
+            <a:r>
+              <a:rPr lang="en-US" dirty="0" err="1" smtClean="0"/>
+              <a:t>IssueLink</a:t>
+            </a:r>
+            <a:endParaRPr lang="en-US" dirty="0" smtClean="0"/>
+          </a:p>
+          <a:p>
+            <a:r>
+              <a:rPr lang="en-US" dirty="0" err="1" smtClean="0"/>
+              <a:t>ZippedCodeLink</a:t>
+            </a:r>
             <a:endParaRPr lang="en-US" dirty="0" smtClean="0"/>
           </a:p>
         </p:txBody>
@@ -5679,7 +5674,7 @@
     </p:spTree>
     <p:extLst>
       <p:ext uri="{BB962C8B-B14F-4D97-AF65-F5344CB8AC3E}">
-        <p14:creationId xmlns:p14="http://schemas.microsoft.com/office/powerpoint/2010/main" val="3885830929"/>
+        <p14:creationId xmlns:p14="http://schemas.microsoft.com/office/powerpoint/2010/main" val="1727131935"/>
       </p:ext>
     </p:extLst>
   </p:cSld>
@@ -5716,7 +5711,7 @@
       </p:grpSpPr>
       <p:sp>
         <p:nvSpPr>
-          <p:cNvPr id="3" name="Title 2"/>
+          <p:cNvPr id="2" name="Title 1"/>
           <p:cNvSpPr>
             <a:spLocks noGrp="1"/>
           </p:cNvSpPr>
@@ -5730,8 +5725,12 @@
           <a:lstStyle/>
           <a:p>
             <a:r>
-              <a:rPr lang="en-US" dirty="0" smtClean="0"/>
-              <a:t>Acknowledgements</a:t>
+              <a:rPr lang="en-US" dirty="0" err="1" smtClean="0"/>
+              <a:t>CodeMeta</a:t>
+            </a:r>
+            <a:r>
+              <a:rPr lang="en-US" dirty="0" smtClean="0"/>
+              <a:t> Concepts: Function</a:t>
             </a:r>
             <a:endParaRPr lang="en-US" dirty="0"/>
           </a:p>
@@ -5739,7 +5738,7 @@
       </p:sp>
       <p:sp>
         <p:nvSpPr>
-          <p:cNvPr id="2" name="Content Placeholder 1"/>
+          <p:cNvPr id="3" name="Text Placeholder 2"/>
           <p:cNvSpPr>
             <a:spLocks noGrp="1"/>
           </p:cNvSpPr>
@@ -5752,150 +5751,264 @@
           <a:bodyPr/>
           <a:lstStyle/>
           <a:p>
-            <a:endParaRPr lang="en-US" dirty="0" smtClean="0"/>
-          </a:p>
-          <a:p>
-            <a:r>
-              <a:rPr lang="en-US" dirty="0" smtClean="0"/>
-              <a:t>Funding for </a:t>
-            </a:r>
+            <a:r>
+              <a:rPr lang="en-US" dirty="0" smtClean="0"/>
+              <a:t>Inputs</a:t>
+            </a:r>
+            <a:endParaRPr lang="en-US" dirty="0"/>
+          </a:p>
+          <a:p>
+            <a:r>
+              <a:rPr lang="en-US" dirty="0"/>
+              <a:t>Outputs</a:t>
+            </a:r>
+          </a:p>
+          <a:p>
+            <a:r>
+              <a:rPr lang="en-US" dirty="0"/>
+              <a:t>Function</a:t>
+            </a:r>
+          </a:p>
+          <a:p>
+            <a:r>
+              <a:rPr lang="en-US" dirty="0"/>
+              <a:t>Dependency</a:t>
+            </a:r>
+          </a:p>
+          <a:p>
+            <a:r>
+              <a:rPr lang="en-US" dirty="0"/>
+              <a:t>Suggests</a:t>
+            </a:r>
+          </a:p>
+          <a:p>
+            <a:r>
+              <a:rPr lang="en-US" dirty="0"/>
+              <a:t>Relationship</a:t>
+            </a:r>
+          </a:p>
+          <a:p>
+            <a:r>
+              <a:rPr lang="en-US" dirty="0" smtClean="0"/>
+              <a:t>Package</a:t>
+            </a:r>
+            <a:endParaRPr lang="en-US" dirty="0"/>
+          </a:p>
+          <a:p>
             <a:r>
               <a:rPr lang="en-US" dirty="0" err="1" smtClean="0"/>
-              <a:t>CodeMeta</a:t>
-            </a:r>
-            <a:r>
-              <a:rPr lang="en-US" dirty="0" smtClean="0"/>
-              <a:t> from </a:t>
-            </a:r>
-            <a:r>
-              <a:rPr lang="en-US" dirty="0" smtClean="0"/>
-              <a:t>NSF</a:t>
-            </a:r>
+              <a:t>InteractionMethod</a:t>
+            </a:r>
+            <a:endParaRPr lang="en-US" dirty="0"/>
+          </a:p>
+          <a:p>
+            <a:r>
+              <a:rPr lang="en-US" dirty="0" err="1" smtClean="0"/>
+              <a:t>ProgrammingLanguage</a:t>
+            </a:r>
+            <a:endParaRPr lang="en-US" dirty="0"/>
           </a:p>
         </p:txBody>
       </p:sp>
-      <p:pic>
-        <p:nvPicPr>
-          <p:cNvPr id="4" name="Picture 3" descr="nsf_logo_color_transparent.gif"/>
-          <p:cNvPicPr>
-            <a:picLocks noChangeAspect="1"/>
-          </p:cNvPicPr>
+      <p:sp>
+        <p:nvSpPr>
+          <p:cNvPr id="4" name="Text Placeholder 2"/>
+          <p:cNvSpPr txBox="1">
+            <a:spLocks/>
+          </p:cNvSpPr>
           <p:nvPr/>
-        </p:nvPicPr>
-        <p:blipFill>
-          <a:blip r:embed="rId2" cstate="print">
-            <a:extLst>
-              <a:ext uri="{28A0092B-C50C-407E-A947-70E740481C1C}">
-                <a14:useLocalDpi xmlns:a14="http://schemas.microsoft.com/office/drawing/2010/main"/>
-              </a:ext>
-            </a:extLst>
-          </a:blip>
-          <a:stretch>
-            <a:fillRect/>
-          </a:stretch>
-        </p:blipFill>
+        </p:nvSpPr>
         <p:spPr>
           <a:xfrm>
-            <a:off x="5710759" y="1906234"/>
-            <a:ext cx="862684" cy="862684"/>
+            <a:off x="4640064" y="1598414"/>
+            <a:ext cx="8233172" cy="5259586"/>
           </a:xfrm>
           <a:prstGeom prst="rect">
             <a:avLst/>
           </a:prstGeom>
         </p:spPr>
-      </p:pic>
-      <p:pic>
-        <p:nvPicPr>
-          <p:cNvPr id="6" name="Shape 88"/>
-          <p:cNvPicPr preferRelativeResize="0"/>
-          <p:nvPr/>
-        </p:nvPicPr>
-        <p:blipFill rotWithShape="1">
-          <a:blip r:embed="rId3">
-            <a:alphaModFix/>
-          </a:blip>
-          <a:srcRect/>
-          <a:stretch/>
-        </p:blipFill>
-        <p:spPr>
-          <a:xfrm>
-            <a:off x="2870009" y="3208880"/>
-            <a:ext cx="3948799" cy="1790719"/>
-          </a:xfrm>
-          <a:prstGeom prst="rect">
-            <a:avLst/>
-          </a:prstGeom>
-          <a:noFill/>
-          <a:ln>
-            <a:noFill/>
-          </a:ln>
-        </p:spPr>
-      </p:pic>
-      <p:sp>
-        <p:nvSpPr>
-          <p:cNvPr id="7" name="Shape 89"/>
-          <p:cNvSpPr/>
-          <p:nvPr/>
-        </p:nvSpPr>
-        <p:spPr>
-          <a:xfrm>
-            <a:off x="264583" y="4952999"/>
-            <a:ext cx="8773583" cy="1739945"/>
-          </a:xfrm>
-          <a:prstGeom prst="rect">
-            <a:avLst/>
-          </a:prstGeom>
-          <a:noFill/>
-          <a:ln>
-            <a:noFill/>
-          </a:ln>
-        </p:spPr>
         <p:txBody>
-          <a:bodyPr lIns="46577" tIns="46577" rIns="46577" bIns="46577" anchor="ctr" anchorCtr="0">
-            <a:noAutofit/>
-          </a:bodyPr>
-          <a:lstStyle/>
-          <a:p>
-            <a:pPr algn="ctr" rtl="0">
-              <a:buSzPct val="25000"/>
-            </a:pPr>
-            <a:r>
-              <a:rPr lang="en" sz="3300" dirty="0">
-                <a:solidFill>
-                  <a:srgbClr val="000000"/>
-                </a:solidFill>
-                <a:latin typeface="Helvetica Neue"/>
-                <a:ea typeface="Helvetica Neue"/>
-                <a:cs typeface="Helvetica Neue"/>
-                <a:sym typeface="Helvetica Neue"/>
-              </a:rPr>
-              <a:t>This presentation is made available under a CC-BY 4.0 license.</a:t>
-            </a:r>
-          </a:p>
-          <a:p>
-            <a:pPr algn="ctr" rtl="0">
-              <a:buSzPct val="25000"/>
-            </a:pPr>
-            <a:r>
-              <a:rPr lang="en" sz="3300" u="sng" dirty="0">
-                <a:solidFill>
-                  <a:schemeClr val="hlink"/>
-                </a:solidFill>
-                <a:latin typeface="Helvetica Neue"/>
-                <a:ea typeface="Helvetica Neue"/>
-                <a:cs typeface="Helvetica Neue"/>
-                <a:sym typeface="Helvetica Neue"/>
-                <a:hlinkClick r:id="rId4"/>
-              </a:rPr>
-              <a:t>http://creativecommons.org/licenses/by/4.0/</a:t>
-            </a:r>
+          <a:bodyPr lIns="64291" tIns="32146" rIns="64291" bIns="32146"/>
+          <a:lstStyle>
+            <a:lvl1pPr marL="401822" indent="-401822" algn="l" defTabSz="457200" rtl="0" eaLnBrk="1" latinLnBrk="0" hangingPunct="1">
+              <a:spcBef>
+                <a:spcPts val="633"/>
+              </a:spcBef>
+              <a:buClrTx/>
+              <a:buSzPct val="75000"/>
+              <a:buFont typeface="Arial"/>
+              <a:buChar char="•"/>
+              <a:defRPr sz="2800" kern="1200">
+                <a:solidFill>
+                  <a:srgbClr val="1A435D"/>
+                </a:solidFill>
+                <a:latin typeface="+mn-lt"/>
+                <a:ea typeface="+mn-ea"/>
+                <a:cs typeface="Cambria"/>
+              </a:defRPr>
+            </a:lvl1pPr>
+            <a:lvl2pPr marL="714350" indent="-401822" algn="l" defTabSz="457200" rtl="0" eaLnBrk="1" latinLnBrk="0" hangingPunct="1">
+              <a:spcBef>
+                <a:spcPts val="633"/>
+              </a:spcBef>
+              <a:buClrTx/>
+              <a:buSzPct val="75000"/>
+              <a:buFont typeface="Arial"/>
+              <a:buChar char="•"/>
+              <a:defRPr sz="2500" b="0" kern="1200">
+                <a:solidFill>
+                  <a:srgbClr val="1A435D"/>
+                </a:solidFill>
+                <a:latin typeface="+mn-lt"/>
+                <a:ea typeface="+mn-ea"/>
+                <a:cs typeface="Cambria"/>
+              </a:defRPr>
+            </a:lvl2pPr>
+            <a:lvl3pPr marL="946513" indent="-321457" algn="l" defTabSz="457200" rtl="0" eaLnBrk="1" latinLnBrk="0" hangingPunct="1">
+              <a:spcBef>
+                <a:spcPts val="633"/>
+              </a:spcBef>
+              <a:buClrTx/>
+              <a:buSzPct val="75000"/>
+              <a:buFont typeface="Arial"/>
+              <a:buChar char="•"/>
+              <a:defRPr sz="2200" b="0" kern="1200">
+                <a:solidFill>
+                  <a:srgbClr val="1A435D"/>
+                </a:solidFill>
+                <a:latin typeface="+mn-lt"/>
+                <a:ea typeface="+mn-ea"/>
+                <a:cs typeface="Cambria"/>
+              </a:defRPr>
+            </a:lvl3pPr>
+            <a:lvl4pPr marL="1259041" indent="-321457" algn="l" defTabSz="457200" rtl="0" eaLnBrk="1" latinLnBrk="0" hangingPunct="1">
+              <a:spcBef>
+                <a:spcPts val="633"/>
+              </a:spcBef>
+              <a:buClrTx/>
+              <a:buSzPct val="75000"/>
+              <a:buFont typeface="Arial"/>
+              <a:buChar char="•"/>
+              <a:defRPr sz="2000" b="0" i="1" kern="1200">
+                <a:solidFill>
+                  <a:srgbClr val="1A435D"/>
+                </a:solidFill>
+                <a:latin typeface="+mn-lt"/>
+                <a:ea typeface="+mn-ea"/>
+                <a:cs typeface="Cambria"/>
+              </a:defRPr>
+            </a:lvl4pPr>
+            <a:lvl5pPr marL="1571569" indent="-321457" algn="l" defTabSz="457200" rtl="0" eaLnBrk="1" latinLnBrk="0" hangingPunct="1">
+              <a:spcBef>
+                <a:spcPts val="633"/>
+              </a:spcBef>
+              <a:buClrTx/>
+              <a:buSzPct val="75000"/>
+              <a:buFont typeface="Arial"/>
+              <a:buChar char="•"/>
+              <a:defRPr sz="2000" b="0" i="1" kern="1200">
+                <a:solidFill>
+                  <a:srgbClr val="1A435D"/>
+                </a:solidFill>
+                <a:latin typeface="+mn-lt"/>
+                <a:ea typeface="+mn-ea"/>
+                <a:cs typeface="Cambria"/>
+              </a:defRPr>
+            </a:lvl5pPr>
+            <a:lvl6pPr marL="2514600" indent="-228600" algn="l" defTabSz="457200" rtl="0" eaLnBrk="1" latinLnBrk="0" hangingPunct="1">
+              <a:spcBef>
+                <a:spcPct val="20000"/>
+              </a:spcBef>
+              <a:buFont typeface="Arial"/>
+              <a:buChar char="•"/>
+              <a:defRPr sz="2000" kern="1200">
+                <a:solidFill>
+                  <a:schemeClr val="tx1"/>
+                </a:solidFill>
+                <a:latin typeface="+mn-lt"/>
+                <a:ea typeface="+mn-ea"/>
+                <a:cs typeface="+mn-cs"/>
+              </a:defRPr>
+            </a:lvl6pPr>
+            <a:lvl7pPr marL="2971800" indent="-228600" algn="l" defTabSz="457200" rtl="0" eaLnBrk="1" latinLnBrk="0" hangingPunct="1">
+              <a:spcBef>
+                <a:spcPct val="20000"/>
+              </a:spcBef>
+              <a:buFont typeface="Arial"/>
+              <a:buChar char="•"/>
+              <a:defRPr sz="2000" kern="1200">
+                <a:solidFill>
+                  <a:schemeClr val="tx1"/>
+                </a:solidFill>
+                <a:latin typeface="+mn-lt"/>
+                <a:ea typeface="+mn-ea"/>
+                <a:cs typeface="+mn-cs"/>
+              </a:defRPr>
+            </a:lvl7pPr>
+            <a:lvl8pPr marL="3429000" indent="-228600" algn="l" defTabSz="457200" rtl="0" eaLnBrk="1" latinLnBrk="0" hangingPunct="1">
+              <a:spcBef>
+                <a:spcPct val="20000"/>
+              </a:spcBef>
+              <a:buFont typeface="Arial"/>
+              <a:buChar char="•"/>
+              <a:defRPr sz="2000" kern="1200">
+                <a:solidFill>
+                  <a:schemeClr val="tx1"/>
+                </a:solidFill>
+                <a:latin typeface="+mn-lt"/>
+                <a:ea typeface="+mn-ea"/>
+                <a:cs typeface="+mn-cs"/>
+              </a:defRPr>
+            </a:lvl8pPr>
+            <a:lvl9pPr marL="3886200" indent="-228600" algn="l" defTabSz="457200" rtl="0" eaLnBrk="1" latinLnBrk="0" hangingPunct="1">
+              <a:spcBef>
+                <a:spcPct val="20000"/>
+              </a:spcBef>
+              <a:buFont typeface="Arial"/>
+              <a:buChar char="•"/>
+              <a:defRPr sz="2000" kern="1200">
+                <a:solidFill>
+                  <a:schemeClr val="tx1"/>
+                </a:solidFill>
+                <a:latin typeface="+mn-lt"/>
+                <a:ea typeface="+mn-ea"/>
+                <a:cs typeface="+mn-cs"/>
+              </a:defRPr>
+            </a:lvl9pPr>
+          </a:lstStyle>
+          <a:p>
+            <a:r>
+              <a:rPr lang="en-US" dirty="0" err="1"/>
+              <a:t>TestCoverage</a:t>
+            </a:r>
+            <a:endParaRPr lang="en-US" dirty="0"/>
+          </a:p>
+          <a:p>
+            <a:r>
+              <a:rPr lang="en-US" dirty="0" err="1"/>
+              <a:t>DocsCoverage</a:t>
+            </a:r>
+            <a:endParaRPr lang="en-US" dirty="0"/>
+          </a:p>
+          <a:p>
+            <a:r>
+              <a:rPr lang="en-US" dirty="0" err="1" smtClean="0"/>
+              <a:t>IsAutomated</a:t>
+            </a:r>
+            <a:endParaRPr lang="en-US" dirty="0" smtClean="0"/>
+          </a:p>
+          <a:p>
+            <a:endParaRPr lang="en-US" dirty="0"/>
+          </a:p>
+          <a:p>
+            <a:endParaRPr lang="en-US" dirty="0" smtClean="0"/>
           </a:p>
         </p:txBody>
       </p:sp>
     </p:spTree>
     <p:extLst>
       <p:ext uri="{BB962C8B-B14F-4D97-AF65-F5344CB8AC3E}">
-        <p14:creationId xmlns:p14="http://schemas.microsoft.com/office/powerpoint/2010/main" val="1275632987"/>
+        <p14:creationId xmlns:p14="http://schemas.microsoft.com/office/powerpoint/2010/main" val="3885830929"/>
       </p:ext>
     </p:extLst>
   </p:cSld>

</xml_diff>